<commit_message>
update in qr support new qr standard for better redirecting and more functionality
</commit_message>
<xml_diff>
--- a/assets/utils/Navit.pptx
+++ b/assets/utils/Navit.pptx
@@ -226,7 +226,7 @@
           <a:p>
             <a:fld id="{2D882CDC-3228-4D20-B800-E065C5CB9194}" type="datetimeFigureOut">
               <a:rPr lang="en-US" smtClean="0"/>
-              <a:t>4/3/2025</a:t>
+              <a:t>4/7/2025</a:t>
             </a:fld>
             <a:endParaRPr lang="en-US"/>
           </a:p>
@@ -865,7 +865,7 @@
             <a:fld id="{1D8BD707-D9CF-40AE-B4C6-C98DA3205C09}" type="datetimeFigureOut">
               <a:rPr lang="en-US" smtClean="0"/>
               <a:pPr/>
-              <a:t>4/3/2025</a:t>
+              <a:t>4/7/2025</a:t>
             </a:fld>
             <a:endParaRPr lang="en-US"/>
           </a:p>
@@ -1030,7 +1030,7 @@
             <a:fld id="{1D8BD707-D9CF-40AE-B4C6-C98DA3205C09}" type="datetimeFigureOut">
               <a:rPr lang="en-US" smtClean="0"/>
               <a:pPr/>
-              <a:t>4/3/2025</a:t>
+              <a:t>4/7/2025</a:t>
             </a:fld>
             <a:endParaRPr lang="en-US"/>
           </a:p>
@@ -1205,7 +1205,7 @@
             <a:fld id="{1D8BD707-D9CF-40AE-B4C6-C98DA3205C09}" type="datetimeFigureOut">
               <a:rPr lang="en-US" smtClean="0"/>
               <a:pPr/>
-              <a:t>4/3/2025</a:t>
+              <a:t>4/7/2025</a:t>
             </a:fld>
             <a:endParaRPr lang="en-US"/>
           </a:p>
@@ -1370,7 +1370,7 @@
             <a:fld id="{1D8BD707-D9CF-40AE-B4C6-C98DA3205C09}" type="datetimeFigureOut">
               <a:rPr lang="en-US" smtClean="0"/>
               <a:pPr/>
-              <a:t>4/3/2025</a:t>
+              <a:t>4/7/2025</a:t>
             </a:fld>
             <a:endParaRPr lang="en-US"/>
           </a:p>
@@ -1612,7 +1612,7 @@
             <a:fld id="{1D8BD707-D9CF-40AE-B4C6-C98DA3205C09}" type="datetimeFigureOut">
               <a:rPr lang="en-US" smtClean="0"/>
               <a:pPr/>
-              <a:t>4/3/2025</a:t>
+              <a:t>4/7/2025</a:t>
             </a:fld>
             <a:endParaRPr lang="en-US"/>
           </a:p>
@@ -1894,7 +1894,7 @@
             <a:fld id="{1D8BD707-D9CF-40AE-B4C6-C98DA3205C09}" type="datetimeFigureOut">
               <a:rPr lang="en-US" smtClean="0"/>
               <a:pPr/>
-              <a:t>4/3/2025</a:t>
+              <a:t>4/7/2025</a:t>
             </a:fld>
             <a:endParaRPr lang="en-US"/>
           </a:p>
@@ -2310,7 +2310,7 @@
             <a:fld id="{1D8BD707-D9CF-40AE-B4C6-C98DA3205C09}" type="datetimeFigureOut">
               <a:rPr lang="en-US" smtClean="0"/>
               <a:pPr/>
-              <a:t>4/3/2025</a:t>
+              <a:t>4/7/2025</a:t>
             </a:fld>
             <a:endParaRPr lang="en-US"/>
           </a:p>
@@ -2424,7 +2424,7 @@
             <a:fld id="{1D8BD707-D9CF-40AE-B4C6-C98DA3205C09}" type="datetimeFigureOut">
               <a:rPr lang="en-US" smtClean="0"/>
               <a:pPr/>
-              <a:t>4/3/2025</a:t>
+              <a:t>4/7/2025</a:t>
             </a:fld>
             <a:endParaRPr lang="en-US"/>
           </a:p>
@@ -2516,7 +2516,7 @@
             <a:fld id="{1D8BD707-D9CF-40AE-B4C6-C98DA3205C09}" type="datetimeFigureOut">
               <a:rPr lang="en-US" smtClean="0"/>
               <a:pPr/>
-              <a:t>4/3/2025</a:t>
+              <a:t>4/7/2025</a:t>
             </a:fld>
             <a:endParaRPr lang="en-US"/>
           </a:p>
@@ -2788,7 +2788,7 @@
             <a:fld id="{1D8BD707-D9CF-40AE-B4C6-C98DA3205C09}" type="datetimeFigureOut">
               <a:rPr lang="en-US" smtClean="0"/>
               <a:pPr/>
-              <a:t>4/3/2025</a:t>
+              <a:t>4/7/2025</a:t>
             </a:fld>
             <a:endParaRPr lang="en-US"/>
           </a:p>
@@ -3037,7 +3037,7 @@
             <a:fld id="{1D8BD707-D9CF-40AE-B4C6-C98DA3205C09}" type="datetimeFigureOut">
               <a:rPr lang="en-US" smtClean="0"/>
               <a:pPr/>
-              <a:t>4/3/2025</a:t>
+              <a:t>4/7/2025</a:t>
             </a:fld>
             <a:endParaRPr lang="en-US"/>
           </a:p>
@@ -3245,7 +3245,7 @@
             <a:fld id="{1D8BD707-D9CF-40AE-B4C6-C98DA3205C09}" type="datetimeFigureOut">
               <a:rPr lang="en-US" smtClean="0"/>
               <a:pPr/>
-              <a:t>4/3/2025</a:t>
+              <a:t>4/7/2025</a:t>
             </a:fld>
             <a:endParaRPr lang="en-US"/>
           </a:p>
@@ -4765,7 +4765,7 @@
           <a:bodyPr/>
           <a:lstStyle/>
           <a:p>
-            <a:endParaRPr lang="en-US"/>
+            <a:endParaRPr lang="en-US" dirty="0"/>
           </a:p>
         </p:txBody>
       </p:sp>
@@ -5159,7 +5159,7 @@
         </p:blipFill>
         <p:spPr>
           <a:xfrm>
-            <a:off x="2337996" y="3859888"/>
+            <a:off x="2337996" y="3651791"/>
             <a:ext cx="5611008" cy="5620534"/>
           </a:xfrm>
           <a:prstGeom prst="rect">
@@ -5226,100 +5226,6 @@
           </a:p>
         </p:txBody>
       </p:sp>
-      <p:cxnSp>
-        <p:nvCxnSpPr>
-          <p:cNvPr id="40" name="Straight Connector 39">
-            <a:extLst>
-              <a:ext uri="{FF2B5EF4-FFF2-40B4-BE49-F238E27FC236}">
-                <a16:creationId xmlns:a16="http://schemas.microsoft.com/office/drawing/2014/main" id="{13F84247-EB00-EA2A-FC26-6F0F5AFAC9C7}"/>
-              </a:ext>
-            </a:extLst>
-          </p:cNvPr>
-          <p:cNvCxnSpPr>
-            <a:cxnSpLocks/>
-          </p:cNvCxnSpPr>
-          <p:nvPr/>
-        </p:nvCxnSpPr>
-        <p:spPr>
-          <a:xfrm>
-            <a:off x="6515100" y="6650538"/>
-            <a:ext cx="1828800" cy="0"/>
-          </a:xfrm>
-          <a:prstGeom prst="line">
-            <a:avLst/>
-          </a:prstGeom>
-          <a:ln w="76200" cap="flat" cmpd="sng" algn="ctr">
-            <a:solidFill>
-              <a:schemeClr val="dk1"/>
-            </a:solidFill>
-            <a:prstDash val="solid"/>
-            <a:round/>
-            <a:headEnd type="none" w="med" len="med"/>
-            <a:tailEnd type="arrow" w="med" len="med"/>
-          </a:ln>
-        </p:spPr>
-        <p:style>
-          <a:lnRef idx="0">
-            <a:scrgbClr r="0" g="0" b="0"/>
-          </a:lnRef>
-          <a:fillRef idx="0">
-            <a:scrgbClr r="0" g="0" b="0"/>
-          </a:fillRef>
-          <a:effectRef idx="0">
-            <a:scrgbClr r="0" g="0" b="0"/>
-          </a:effectRef>
-          <a:fontRef idx="minor">
-            <a:schemeClr val="tx1"/>
-          </a:fontRef>
-        </p:style>
-      </p:cxnSp>
-      <p:cxnSp>
-        <p:nvCxnSpPr>
-          <p:cNvPr id="43" name="Straight Connector 42">
-            <a:extLst>
-              <a:ext uri="{FF2B5EF4-FFF2-40B4-BE49-F238E27FC236}">
-                <a16:creationId xmlns:a16="http://schemas.microsoft.com/office/drawing/2014/main" id="{43299FB5-DFE9-47B7-4C16-38CA135C023A}"/>
-              </a:ext>
-            </a:extLst>
-          </p:cNvPr>
-          <p:cNvCxnSpPr>
-            <a:cxnSpLocks/>
-          </p:cNvCxnSpPr>
-          <p:nvPr/>
-        </p:nvCxnSpPr>
-        <p:spPr>
-          <a:xfrm>
-            <a:off x="6057900" y="8343900"/>
-            <a:ext cx="2396456" cy="0"/>
-          </a:xfrm>
-          <a:prstGeom prst="line">
-            <a:avLst/>
-          </a:prstGeom>
-          <a:ln w="76200" cap="flat" cmpd="sng" algn="ctr">
-            <a:solidFill>
-              <a:schemeClr val="dk1"/>
-            </a:solidFill>
-            <a:prstDash val="solid"/>
-            <a:round/>
-            <a:headEnd type="none" w="med" len="med"/>
-            <a:tailEnd type="arrow" w="med" len="med"/>
-          </a:ln>
-        </p:spPr>
-        <p:style>
-          <a:lnRef idx="0">
-            <a:scrgbClr r="0" g="0" b="0"/>
-          </a:lnRef>
-          <a:fillRef idx="0">
-            <a:scrgbClr r="0" g="0" b="0"/>
-          </a:fillRef>
-          <a:effectRef idx="0">
-            <a:scrgbClr r="0" g="0" b="0"/>
-          </a:effectRef>
-          <a:fontRef idx="minor">
-            <a:schemeClr val="tx1"/>
-          </a:fontRef>
-        </p:style>
-      </p:cxnSp>
       <p:cxnSp>
         <p:nvCxnSpPr>
           <p:cNvPr id="44" name="Straight Connector 43">
@@ -5336,31 +5242,28 @@
         </p:nvCxnSpPr>
         <p:spPr>
           <a:xfrm flipH="1">
-            <a:off x="1943100" y="8648700"/>
+            <a:off x="1505879" y="8136340"/>
             <a:ext cx="2708944" cy="0"/>
           </a:xfrm>
           <a:prstGeom prst="line">
             <a:avLst/>
           </a:prstGeom>
-          <a:ln w="76200" cap="flat" cmpd="sng" algn="ctr">
+          <a:ln w="57150">
             <a:solidFill>
-              <a:schemeClr val="dk1"/>
+              <a:schemeClr val="tx1"/>
             </a:solidFill>
-            <a:prstDash val="solid"/>
-            <a:round/>
-            <a:headEnd type="none" w="med" len="med"/>
-            <a:tailEnd type="arrow" w="med" len="med"/>
+            <a:tailEnd type="triangle"/>
           </a:ln>
         </p:spPr>
         <p:style>
-          <a:lnRef idx="0">
-            <a:scrgbClr r="0" g="0" b="0"/>
+          <a:lnRef idx="1">
+            <a:schemeClr val="accent1"/>
           </a:lnRef>
           <a:fillRef idx="0">
-            <a:scrgbClr r="0" g="0" b="0"/>
+            <a:schemeClr val="accent1"/>
           </a:fillRef>
           <a:effectRef idx="0">
-            <a:scrgbClr r="0" g="0" b="0"/>
+            <a:schemeClr val="accent1"/>
           </a:effectRef>
           <a:fontRef idx="minor">
             <a:schemeClr val="tx1"/>
@@ -5381,8 +5284,8 @@
         </p:nvSpPr>
         <p:spPr>
           <a:xfrm>
-            <a:off x="8267700" y="6134100"/>
-            <a:ext cx="1870744" cy="1730602"/>
+            <a:off x="7949004" y="8801100"/>
+            <a:ext cx="2066333" cy="578043"/>
           </a:xfrm>
           <a:prstGeom prst="rect">
             <a:avLst/>
@@ -5437,94 +5340,6 @@
               <a:t>Data format :</a:t>
             </a:r>
           </a:p>
-          <a:p>
-            <a:pPr>
-              <a:lnSpc>
-                <a:spcPts val="2251"/>
-              </a:lnSpc>
-              <a:spcBef>
-                <a:spcPct val="0"/>
-              </a:spcBef>
-            </a:pPr>
-            <a:r>
-              <a:rPr lang="en-US" sz="1608" dirty="0">
-                <a:solidFill>
-                  <a:srgbClr val="000000"/>
-                </a:solidFill>
-                <a:latin typeface="League Spartan"/>
-                <a:ea typeface="League Spartan"/>
-                <a:cs typeface="League Spartan"/>
-                <a:sym typeface="League Spartan"/>
-              </a:rPr>
-              <a:t>{</a:t>
-            </a:r>
-          </a:p>
-          <a:p>
-            <a:pPr>
-              <a:lnSpc>
-                <a:spcPts val="2251"/>
-              </a:lnSpc>
-              <a:spcBef>
-                <a:spcPct val="0"/>
-              </a:spcBef>
-            </a:pPr>
-            <a:r>
-              <a:rPr lang="en-US" sz="1608" dirty="0">
-                <a:solidFill>
-                  <a:srgbClr val="000000"/>
-                </a:solidFill>
-                <a:latin typeface="League Spartan"/>
-                <a:ea typeface="League Spartan"/>
-                <a:cs typeface="League Spartan"/>
-                <a:sym typeface="League Spartan"/>
-              </a:rPr>
-              <a:t>  “roomid”:“1001”</a:t>
-            </a:r>
-          </a:p>
-          <a:p>
-            <a:pPr>
-              <a:lnSpc>
-                <a:spcPts val="2251"/>
-              </a:lnSpc>
-              <a:spcBef>
-                <a:spcPct val="0"/>
-              </a:spcBef>
-            </a:pPr>
-            <a:r>
-              <a:rPr lang="en-US" sz="1608" dirty="0">
-                <a:solidFill>
-                  <a:srgbClr val="000000"/>
-                </a:solidFill>
-                <a:latin typeface="League Spartan"/>
-                <a:ea typeface="League Spartan"/>
-                <a:cs typeface="League Spartan"/>
-                <a:sym typeface="League Spartan"/>
-              </a:rPr>
-              <a:t>}</a:t>
-            </a:r>
-          </a:p>
-          <a:p>
-            <a:pPr>
-              <a:lnSpc>
-                <a:spcPts val="2251"/>
-              </a:lnSpc>
-              <a:spcBef>
-                <a:spcPct val="0"/>
-              </a:spcBef>
-            </a:pPr>
-            <a:r>
-              <a:rPr lang="en-US" sz="900" dirty="0">
-                <a:solidFill>
-                  <a:srgbClr val="000000"/>
-                </a:solidFill>
-                <a:latin typeface="League Spartan"/>
-                <a:ea typeface="League Spartan"/>
-                <a:cs typeface="League Spartan"/>
-                <a:sym typeface="League Spartan"/>
-              </a:rPr>
-              <a:t>May change the format later</a:t>
-            </a:r>
-          </a:p>
         </p:txBody>
       </p:sp>
       <p:sp>
@@ -5541,7 +5356,7 @@
         </p:nvSpPr>
         <p:spPr>
           <a:xfrm>
-            <a:off x="8072111" y="8070656"/>
+            <a:off x="237850" y="7847320"/>
             <a:ext cx="1684088" cy="578043"/>
           </a:xfrm>
           <a:prstGeom prst="rect">
@@ -5613,8 +5428,8 @@
         </p:nvSpPr>
         <p:spPr>
           <a:xfrm>
-            <a:off x="966404" y="8359678"/>
-            <a:ext cx="1078949" cy="578043"/>
+            <a:off x="1999524" y="9419801"/>
+            <a:ext cx="2004193" cy="283091"/>
           </a:xfrm>
           <a:prstGeom prst="rect">
             <a:avLst/>
@@ -5644,10 +5459,48 @@
                 <a:cs typeface="League Spartan"/>
                 <a:sym typeface="League Spartan"/>
               </a:rPr>
-              <a:t>Room</a:t>
-            </a:r>
-            <a:br>
-              <a:rPr lang="en-US" sz="1608" dirty="0">
+              <a:t>Room Type</a:t>
+            </a:r>
+          </a:p>
+        </p:txBody>
+      </p:sp>
+      <p:sp>
+        <p:nvSpPr>
+          <p:cNvPr id="4" name="TextBox 14">
+            <a:extLst>
+              <a:ext uri="{FF2B5EF4-FFF2-40B4-BE49-F238E27FC236}">
+                <a16:creationId xmlns:a16="http://schemas.microsoft.com/office/drawing/2014/main" id="{6650CB08-77BF-EA75-3D98-CCAC0339B953}"/>
+              </a:ext>
+            </a:extLst>
+          </p:cNvPr>
+          <p:cNvSpPr txBox="1"/>
+          <p:nvPr/>
+        </p:nvSpPr>
+        <p:spPr>
+          <a:xfrm>
+            <a:off x="5600700" y="9451343"/>
+            <a:ext cx="4800600" cy="570028"/>
+          </a:xfrm>
+          <a:prstGeom prst="rect">
+            <a:avLst/>
+          </a:prstGeom>
+        </p:spPr>
+        <p:txBody>
+          <a:bodyPr wrap="square" lIns="0" tIns="0" rIns="0" bIns="0" rtlCol="0" anchor="t">
+            <a:spAutoFit/>
+          </a:bodyPr>
+          <a:lstStyle/>
+          <a:p>
+            <a:pPr>
+              <a:lnSpc>
+                <a:spcPts val="2251"/>
+              </a:lnSpc>
+              <a:spcBef>
+                <a:spcPct val="0"/>
+              </a:spcBef>
+            </a:pPr>
+            <a:r>
+              <a:rPr lang="en-US" sz="1400" dirty="0">
                 <a:solidFill>
                   <a:srgbClr val="000000"/>
                 </a:solidFill>
@@ -5656,9 +5509,20 @@
                 <a:cs typeface="League Spartan"/>
                 <a:sym typeface="League Spartan"/>
               </a:rPr>
-            </a:br>
-            <a:r>
-              <a:rPr lang="en-US" sz="1608" dirty="0">
+              <a:t>https://navit.vercel.app/home?source=1001   </a:t>
+            </a:r>
+          </a:p>
+          <a:p>
+            <a:pPr>
+              <a:lnSpc>
+                <a:spcPts val="2251"/>
+              </a:lnSpc>
+              <a:spcBef>
+                <a:spcPct val="0"/>
+              </a:spcBef>
+            </a:pPr>
+            <a:r>
+              <a:rPr lang="en-US" sz="1400" dirty="0">
                 <a:solidFill>
                   <a:srgbClr val="000000"/>
                 </a:solidFill>
@@ -5667,11 +5531,112 @@
                 <a:cs typeface="League Spartan"/>
                 <a:sym typeface="League Spartan"/>
               </a:rPr>
-              <a:t>Type</a:t>
-            </a:r>
-          </a:p>
-        </p:txBody>
-      </p:sp>
+              <a:t>https://navit.vercel.app/home?destination=1001</a:t>
+            </a:r>
+            <a:endParaRPr lang="en-US" sz="700" dirty="0">
+              <a:solidFill>
+                <a:srgbClr val="000000"/>
+              </a:solidFill>
+              <a:latin typeface="League Spartan"/>
+              <a:ea typeface="League Spartan"/>
+              <a:cs typeface="League Spartan"/>
+              <a:sym typeface="League Spartan"/>
+            </a:endParaRPr>
+          </a:p>
+        </p:txBody>
+      </p:sp>
+      <p:cxnSp>
+        <p:nvCxnSpPr>
+          <p:cNvPr id="15" name="Connector: Elbow 14">
+            <a:extLst>
+              <a:ext uri="{FF2B5EF4-FFF2-40B4-BE49-F238E27FC236}">
+                <a16:creationId xmlns:a16="http://schemas.microsoft.com/office/drawing/2014/main" id="{985EA2B2-EB6F-7705-4A4A-DB8F98728C2C}"/>
+              </a:ext>
+            </a:extLst>
+          </p:cNvPr>
+          <p:cNvCxnSpPr>
+            <a:cxnSpLocks/>
+          </p:cNvCxnSpPr>
+          <p:nvPr/>
+        </p:nvCxnSpPr>
+        <p:spPr>
+          <a:xfrm rot="10800000" flipV="1">
+            <a:off x="3665246" y="8425363"/>
+            <a:ext cx="1196118" cy="1135984"/>
+          </a:xfrm>
+          <a:prstGeom prst="bentConnector3">
+            <a:avLst>
+              <a:gd name="adj1" fmla="val 50000"/>
+            </a:avLst>
+          </a:prstGeom>
+          <a:ln w="57150">
+            <a:solidFill>
+              <a:schemeClr val="tx1"/>
+            </a:solidFill>
+            <a:tailEnd type="triangle"/>
+          </a:ln>
+        </p:spPr>
+        <p:style>
+          <a:lnRef idx="1">
+            <a:schemeClr val="accent1"/>
+          </a:lnRef>
+          <a:fillRef idx="0">
+            <a:schemeClr val="accent1"/>
+          </a:fillRef>
+          <a:effectRef idx="0">
+            <a:schemeClr val="accent1"/>
+          </a:effectRef>
+          <a:fontRef idx="minor">
+            <a:schemeClr val="tx1"/>
+          </a:fontRef>
+        </p:style>
+      </p:cxnSp>
+      <p:cxnSp>
+        <p:nvCxnSpPr>
+          <p:cNvPr id="33" name="Connector: Elbow 32">
+            <a:extLst>
+              <a:ext uri="{FF2B5EF4-FFF2-40B4-BE49-F238E27FC236}">
+                <a16:creationId xmlns:a16="http://schemas.microsoft.com/office/drawing/2014/main" id="{BFB2C375-184C-934F-9087-8F5817B6C1A5}"/>
+              </a:ext>
+            </a:extLst>
+          </p:cNvPr>
+          <p:cNvCxnSpPr>
+            <a:cxnSpLocks/>
+          </p:cNvCxnSpPr>
+          <p:nvPr/>
+        </p:nvCxnSpPr>
+        <p:spPr>
+          <a:xfrm>
+            <a:off x="6552819" y="6442441"/>
+            <a:ext cx="2429351" cy="2216802"/>
+          </a:xfrm>
+          <a:prstGeom prst="bentConnector3">
+            <a:avLst>
+              <a:gd name="adj1" fmla="val 100027"/>
+            </a:avLst>
+          </a:prstGeom>
+          <a:ln w="57150">
+            <a:solidFill>
+              <a:schemeClr val="tx1"/>
+            </a:solidFill>
+            <a:tailEnd type="triangle"/>
+          </a:ln>
+        </p:spPr>
+        <p:style>
+          <a:lnRef idx="1">
+            <a:schemeClr val="accent1"/>
+          </a:lnRef>
+          <a:fillRef idx="0">
+            <a:schemeClr val="accent1"/>
+          </a:fillRef>
+          <a:effectRef idx="0">
+            <a:schemeClr val="accent1"/>
+          </a:effectRef>
+          <a:fontRef idx="minor">
+            <a:schemeClr val="tx1"/>
+          </a:fontRef>
+        </p:style>
+      </p:cxnSp>
     </p:spTree>
     <p:extLst>
       <p:ext uri="{BB962C8B-B14F-4D97-AF65-F5344CB8AC3E}">
@@ -6186,7 +6151,7 @@
               </a:spcBef>
             </a:pPr>
             <a:r>
-              <a:rPr lang="en-US" sz="1882">
+              <a:rPr lang="en-US" sz="1882" dirty="0" err="1">
                 <a:solidFill>
                   <a:srgbClr val="000000"/>
                 </a:solidFill>
@@ -6197,6 +6162,15 @@
               </a:rPr>
               <a:t>navit.vercel.app</a:t>
             </a:r>
+            <a:endParaRPr lang="en-US" sz="1882" dirty="0">
+              <a:solidFill>
+                <a:srgbClr val="000000"/>
+              </a:solidFill>
+              <a:latin typeface="League Spartan"/>
+              <a:ea typeface="League Spartan"/>
+              <a:cs typeface="League Spartan"/>
+              <a:sym typeface="League Spartan"/>
+            </a:endParaRPr>
           </a:p>
         </p:txBody>
       </p:sp>

</xml_diff>